<commit_message>
big build with all the builds together
</commit_message>
<xml_diff>
--- a/builds/microD-breakout-circuit-board.pptx
+++ b/builds/microD-breakout-circuit-board.pptx
@@ -11,9 +11,10 @@
     <p:sldId id="260" r:id="rId5"/>
     <p:sldId id="257" r:id="rId6"/>
     <p:sldId id="258" r:id="rId7"/>
-    <p:sldId id="261" r:id="rId8"/>
-    <p:sldId id="373" r:id="rId9"/>
-    <p:sldId id="372" r:id="rId10"/>
+    <p:sldId id="374" r:id="rId8"/>
+    <p:sldId id="261" r:id="rId9"/>
+    <p:sldId id="373" r:id="rId10"/>
+    <p:sldId id="372" r:id="rId11"/>
   </p:sldIdLst>
   <p:sldSz cx="9144000" cy="6858000" type="screen4x3"/>
   <p:notesSz cx="6858000" cy="9144000"/>
@@ -251,7 +252,7 @@
           <a:p>
             <a:fld id="{4B7D580A-ECE6-45CE-9537-2BC656DFEAD8}" type="datetimeFigureOut">
               <a:rPr lang="en-US" smtClean="0"/>
-              <a:t>8/14/2024</a:t>
+              <a:t>8/18/2024</a:t>
             </a:fld>
             <a:endParaRPr lang="en-US"/>
           </a:p>
@@ -421,7 +422,7 @@
           <a:p>
             <a:fld id="{4B7D580A-ECE6-45CE-9537-2BC656DFEAD8}" type="datetimeFigureOut">
               <a:rPr lang="en-US" smtClean="0"/>
-              <a:t>8/14/2024</a:t>
+              <a:t>8/18/2024</a:t>
             </a:fld>
             <a:endParaRPr lang="en-US"/>
           </a:p>
@@ -601,7 +602,7 @@
           <a:p>
             <a:fld id="{4B7D580A-ECE6-45CE-9537-2BC656DFEAD8}" type="datetimeFigureOut">
               <a:rPr lang="en-US" smtClean="0"/>
-              <a:t>8/14/2024</a:t>
+              <a:t>8/18/2024</a:t>
             </a:fld>
             <a:endParaRPr lang="en-US"/>
           </a:p>
@@ -771,7 +772,7 @@
           <a:p>
             <a:fld id="{4B7D580A-ECE6-45CE-9537-2BC656DFEAD8}" type="datetimeFigureOut">
               <a:rPr lang="en-US" smtClean="0"/>
-              <a:t>8/14/2024</a:t>
+              <a:t>8/18/2024</a:t>
             </a:fld>
             <a:endParaRPr lang="en-US"/>
           </a:p>
@@ -1015,7 +1016,7 @@
           <a:p>
             <a:fld id="{4B7D580A-ECE6-45CE-9537-2BC656DFEAD8}" type="datetimeFigureOut">
               <a:rPr lang="en-US" smtClean="0"/>
-              <a:t>8/14/2024</a:t>
+              <a:t>8/18/2024</a:t>
             </a:fld>
             <a:endParaRPr lang="en-US"/>
           </a:p>
@@ -1247,7 +1248,7 @@
           <a:p>
             <a:fld id="{4B7D580A-ECE6-45CE-9537-2BC656DFEAD8}" type="datetimeFigureOut">
               <a:rPr lang="en-US" smtClean="0"/>
-              <a:t>8/14/2024</a:t>
+              <a:t>8/18/2024</a:t>
             </a:fld>
             <a:endParaRPr lang="en-US"/>
           </a:p>
@@ -1614,7 +1615,7 @@
           <a:p>
             <a:fld id="{4B7D580A-ECE6-45CE-9537-2BC656DFEAD8}" type="datetimeFigureOut">
               <a:rPr lang="en-US" smtClean="0"/>
-              <a:t>8/14/2024</a:t>
+              <a:t>8/18/2024</a:t>
             </a:fld>
             <a:endParaRPr lang="en-US"/>
           </a:p>
@@ -1732,7 +1733,7 @@
           <a:p>
             <a:fld id="{4B7D580A-ECE6-45CE-9537-2BC656DFEAD8}" type="datetimeFigureOut">
               <a:rPr lang="en-US" smtClean="0"/>
-              <a:t>8/14/2024</a:t>
+              <a:t>8/18/2024</a:t>
             </a:fld>
             <a:endParaRPr lang="en-US"/>
           </a:p>
@@ -1827,7 +1828,7 @@
           <a:p>
             <a:fld id="{4B7D580A-ECE6-45CE-9537-2BC656DFEAD8}" type="datetimeFigureOut">
               <a:rPr lang="en-US" smtClean="0"/>
-              <a:t>8/14/2024</a:t>
+              <a:t>8/18/2024</a:t>
             </a:fld>
             <a:endParaRPr lang="en-US"/>
           </a:p>
@@ -2104,7 +2105,7 @@
           <a:p>
             <a:fld id="{4B7D580A-ECE6-45CE-9537-2BC656DFEAD8}" type="datetimeFigureOut">
               <a:rPr lang="en-US" smtClean="0"/>
-              <a:t>8/14/2024</a:t>
+              <a:t>8/18/2024</a:t>
             </a:fld>
             <a:endParaRPr lang="en-US"/>
           </a:p>
@@ -2361,7 +2362,7 @@
           <a:p>
             <a:fld id="{4B7D580A-ECE6-45CE-9537-2BC656DFEAD8}" type="datetimeFigureOut">
               <a:rPr lang="en-US" smtClean="0"/>
-              <a:t>8/14/2024</a:t>
+              <a:t>8/18/2024</a:t>
             </a:fld>
             <a:endParaRPr lang="en-US"/>
           </a:p>
@@ -2574,7 +2575,7 @@
           <a:p>
             <a:fld id="{4B7D580A-ECE6-45CE-9537-2BC656DFEAD8}" type="datetimeFigureOut">
               <a:rPr lang="en-US" smtClean="0"/>
-              <a:t>8/14/2024</a:t>
+              <a:t>8/18/2024</a:t>
             </a:fld>
             <a:endParaRPr lang="en-US"/>
           </a:p>
@@ -3234,6 +3235,151 @@
 </p:sld>
 </file>
 
+<file path=ppt/slides/slide10.xml><?xml version="1.0" encoding="utf-8"?>
+<p:sld xmlns:a="http://schemas.openxmlformats.org/drawingml/2006/main" xmlns:r="http://schemas.openxmlformats.org/officeDocument/2006/relationships" xmlns:p="http://schemas.openxmlformats.org/presentationml/2006/main">
+  <p:cSld>
+    <p:spTree>
+      <p:nvGrpSpPr>
+        <p:cNvPr id="1" name=""/>
+        <p:cNvGrpSpPr/>
+        <p:nvPr/>
+      </p:nvGrpSpPr>
+      <p:grpSpPr>
+        <a:xfrm>
+          <a:off x="0" y="0"/>
+          <a:ext cx="0" cy="0"/>
+          <a:chOff x="0" y="0"/>
+          <a:chExt cx="0" cy="0"/>
+        </a:xfrm>
+      </p:grpSpPr>
+      <p:sp>
+        <p:nvSpPr>
+          <p:cNvPr id="4" name="Rectangle: Rounded Corners 3">
+            <a:extLst>
+              <a:ext uri="{FF2B5EF4-FFF2-40B4-BE49-F238E27FC236}">
+                <a16:creationId xmlns:a16="http://schemas.microsoft.com/office/drawing/2014/main" id="{E915C3A0-1839-BADE-47E8-94C846809C6E}"/>
+              </a:ext>
+            </a:extLst>
+          </p:cNvPr>
+          <p:cNvSpPr/>
+          <p:nvPr/>
+        </p:nvSpPr>
+        <p:spPr>
+          <a:xfrm>
+            <a:off x="3117900" y="6086117"/>
+            <a:ext cx="2671807" cy="613345"/>
+          </a:xfrm>
+          <a:prstGeom prst="roundRect">
+            <a:avLst/>
+          </a:prstGeom>
+          <a:ln>
+            <a:solidFill>
+              <a:schemeClr val="tx1"/>
+            </a:solidFill>
+          </a:ln>
+        </p:spPr>
+        <p:style>
+          <a:lnRef idx="3">
+            <a:schemeClr val="lt1"/>
+          </a:lnRef>
+          <a:fillRef idx="1">
+            <a:schemeClr val="accent6"/>
+          </a:fillRef>
+          <a:effectRef idx="1">
+            <a:schemeClr val="accent6"/>
+          </a:effectRef>
+          <a:fontRef idx="minor">
+            <a:schemeClr val="lt1"/>
+          </a:fontRef>
+        </p:style>
+        <p:txBody>
+          <a:bodyPr rtlCol="0" anchor="ctr"/>
+          <a:lstStyle/>
+          <a:p>
+            <a:pPr algn="ctr"/>
+            <a:r>
+              <a:rPr lang="en-US" sz="3300" dirty="0"/>
+              <a:t>MEMSDuino</a:t>
+            </a:r>
+            <a:endParaRPr lang="en-US" sz="1350" dirty="0"/>
+          </a:p>
+        </p:txBody>
+      </p:sp>
+      <p:sp>
+        <p:nvSpPr>
+          <p:cNvPr id="6" name="Rectangle: Rounded Corners 5">
+            <a:extLst>
+              <a:ext uri="{FF2B5EF4-FFF2-40B4-BE49-F238E27FC236}">
+                <a16:creationId xmlns:a16="http://schemas.microsoft.com/office/drawing/2014/main" id="{CA2625D8-00CB-1F5D-EC16-0451272B4EFC}"/>
+              </a:ext>
+            </a:extLst>
+          </p:cNvPr>
+          <p:cNvSpPr/>
+          <p:nvPr/>
+        </p:nvSpPr>
+        <p:spPr>
+          <a:xfrm>
+            <a:off x="446586" y="273377"/>
+            <a:ext cx="8621999" cy="5812739"/>
+          </a:xfrm>
+          <a:prstGeom prst="roundRect">
+            <a:avLst/>
+          </a:prstGeom>
+          <a:solidFill>
+            <a:srgbClr val="00B0F0"/>
+          </a:solidFill>
+          <a:ln>
+            <a:solidFill>
+              <a:schemeClr val="tx1"/>
+            </a:solidFill>
+          </a:ln>
+        </p:spPr>
+        <p:style>
+          <a:lnRef idx="3">
+            <a:schemeClr val="lt1"/>
+          </a:lnRef>
+          <a:fillRef idx="1">
+            <a:schemeClr val="accent6"/>
+          </a:fillRef>
+          <a:effectRef idx="1">
+            <a:schemeClr val="accent6"/>
+          </a:effectRef>
+          <a:fontRef idx="minor">
+            <a:schemeClr val="lt1"/>
+          </a:fontRef>
+        </p:style>
+        <p:txBody>
+          <a:bodyPr rtlCol="0" anchor="ctr"/>
+          <a:lstStyle/>
+          <a:p>
+            <a:pPr algn="ctr"/>
+            <a:r>
+              <a:rPr lang="en-US" sz="3600" dirty="0"/>
+              <a:t>Conclusions:</a:t>
+            </a:r>
+          </a:p>
+          <a:p>
+            <a:pPr algn="ctr"/>
+            <a:r>
+              <a:rPr lang="en-US" sz="3600" dirty="0"/>
+              <a:t>Note that pins 13 and 12 connect to ground.  This might not be ideal in certain circumstances. We have broken ground at room temperature and use the metal in the dilution refrigerator for the ground now. This board will almost certainly be different from what other users will want. This example drives all 4 control lines of 4 MEMS switches.</a:t>
+            </a:r>
+          </a:p>
+        </p:txBody>
+      </p:sp>
+    </p:spTree>
+    <p:extLst>
+      <p:ext uri="{BB962C8B-B14F-4D97-AF65-F5344CB8AC3E}">
+        <p14:creationId xmlns:p14="http://schemas.microsoft.com/office/powerpoint/2010/main" val="2471455650"/>
+      </p:ext>
+    </p:extLst>
+  </p:cSld>
+  <p:clrMapOvr>
+    <a:masterClrMapping/>
+  </p:clrMapOvr>
+</p:sld>
+</file>
+
 <file path=ppt/slides/slide2.xml><?xml version="1.0" encoding="utf-8"?>
 <p:sld xmlns:a="http://schemas.openxmlformats.org/drawingml/2006/main" xmlns:r="http://schemas.openxmlformats.org/officeDocument/2006/relationships" xmlns:p="http://schemas.openxmlformats.org/presentationml/2006/main">
   <p:cSld>
@@ -4360,41 +4506,12 @@
           <a:chExt cx="0" cy="0"/>
         </a:xfrm>
       </p:grpSpPr>
-      <p:sp>
-        <p:nvSpPr>
-          <p:cNvPr id="2" name="Title 1">
+      <p:pic>
+        <p:nvPicPr>
+          <p:cNvPr id="5" name="Picture 4" descr="A close-up of a circuit board&#10;&#10;Description automatically generated with low confidence">
             <a:extLst>
               <a:ext uri="{FF2B5EF4-FFF2-40B4-BE49-F238E27FC236}">
-                <a16:creationId xmlns:a16="http://schemas.microsoft.com/office/drawing/2014/main" id="{A068774D-86FB-970C-4A26-FC6DC79F7754}"/>
-              </a:ext>
-            </a:extLst>
-          </p:cNvPr>
-          <p:cNvSpPr>
-            <a:spLocks noGrp="1"/>
-          </p:cNvSpPr>
-          <p:nvPr>
-            <p:ph type="title"/>
-          </p:nvPr>
-        </p:nvSpPr>
-        <p:spPr/>
-        <p:txBody>
-          <a:bodyPr/>
-          <a:lstStyle/>
-          <a:p>
-            <a:pPr algn="ctr"/>
-            <a:r>
-              <a:rPr lang="en-US" dirty="0"/>
-              <a:t>Mechanical Drawing</a:t>
-            </a:r>
-          </a:p>
-        </p:txBody>
-      </p:sp>
-      <p:pic>
-        <p:nvPicPr>
-          <p:cNvPr id="5" name="Picture 4">
-            <a:extLst>
-              <a:ext uri="{FF2B5EF4-FFF2-40B4-BE49-F238E27FC236}">
-                <a16:creationId xmlns:a16="http://schemas.microsoft.com/office/drawing/2014/main" id="{4E4CA0C6-A1DC-D60A-0888-A9871AE3C233}"/>
+                <a16:creationId xmlns:a16="http://schemas.microsoft.com/office/drawing/2014/main" id="{42E3DFCD-831E-BDB9-E761-737B0DEEAB62}"/>
               </a:ext>
             </a:extLst>
           </p:cNvPr>
@@ -4404,15 +4521,21 @@
           <p:nvPr/>
         </p:nvPicPr>
         <p:blipFill>
-          <a:blip r:embed="rId2"/>
+          <a:blip r:embed="rId2">
+            <a:extLst>
+              <a:ext uri="{28A0092B-C50C-407E-A947-70E740481C1C}">
+                <a14:useLocalDpi xmlns:a14="http://schemas.microsoft.com/office/drawing/2010/main" val="0"/>
+              </a:ext>
+            </a:extLst>
+          </a:blip>
           <a:stretch>
             <a:fillRect/>
           </a:stretch>
         </p:blipFill>
         <p:spPr>
           <a:xfrm>
-            <a:off x="628651" y="1336603"/>
-            <a:ext cx="6686550" cy="4768802"/>
+            <a:off x="2313800" y="141027"/>
+            <a:ext cx="4200466" cy="6001551"/>
           </a:xfrm>
           <a:prstGeom prst="rect">
             <a:avLst/>
@@ -4424,7 +4547,7 @@
           <p:cNvPr id="6" name="Rectangle: Rounded Corners 5">
             <a:extLst>
               <a:ext uri="{FF2B5EF4-FFF2-40B4-BE49-F238E27FC236}">
-                <a16:creationId xmlns:a16="http://schemas.microsoft.com/office/drawing/2014/main" id="{DA7EB3B4-7F12-3581-3D0D-F8102B649759}"/>
+                <a16:creationId xmlns:a16="http://schemas.microsoft.com/office/drawing/2014/main" id="{65EDFBB1-5966-BA56-EC47-047038A28956}"/>
               </a:ext>
             </a:extLst>
           </p:cNvPr>
@@ -4475,7 +4598,7 @@
     </p:spTree>
     <p:extLst>
       <p:ext uri="{BB962C8B-B14F-4D97-AF65-F5344CB8AC3E}">
-        <p14:creationId xmlns:p14="http://schemas.microsoft.com/office/powerpoint/2010/main" val="1830095202"/>
+        <p14:creationId xmlns:p14="http://schemas.microsoft.com/office/powerpoint/2010/main" val="314671818"/>
       </p:ext>
     </p:extLst>
   </p:cSld>
@@ -4507,7 +4630,7 @@
           <p:cNvPr id="2" name="Title 1">
             <a:extLst>
               <a:ext uri="{FF2B5EF4-FFF2-40B4-BE49-F238E27FC236}">
-                <a16:creationId xmlns:a16="http://schemas.microsoft.com/office/drawing/2014/main" id="{BF39A020-48CA-F162-EDFA-B6222569535B}"/>
+                <a16:creationId xmlns:a16="http://schemas.microsoft.com/office/drawing/2014/main" id="{A068774D-86FB-970C-4A26-FC6DC79F7754}"/>
               </a:ext>
             </a:extLst>
           </p:cNvPr>
@@ -4518,12 +4641,7 @@
             <p:ph type="title"/>
           </p:nvPr>
         </p:nvSpPr>
-        <p:spPr>
-          <a:xfrm>
-            <a:off x="628650" y="0"/>
-            <a:ext cx="7886700" cy="1325563"/>
-          </a:xfrm>
-        </p:spPr>
+        <p:spPr/>
         <p:txBody>
           <a:bodyPr/>
           <a:lstStyle/>
@@ -4531,7 +4649,7 @@
             <a:pPr algn="ctr"/>
             <a:r>
               <a:rPr lang="en-US" dirty="0"/>
-              <a:t>Altium Designer Files</a:t>
+              <a:t>Mechanical Drawing</a:t>
             </a:r>
           </a:p>
         </p:txBody>
@@ -4541,7 +4659,7 @@
           <p:cNvPr id="5" name="Picture 4">
             <a:extLst>
               <a:ext uri="{FF2B5EF4-FFF2-40B4-BE49-F238E27FC236}">
-                <a16:creationId xmlns:a16="http://schemas.microsoft.com/office/drawing/2014/main" id="{85F7195A-5450-0C90-7483-9634E8C209FA}"/>
+                <a16:creationId xmlns:a16="http://schemas.microsoft.com/office/drawing/2014/main" id="{4E4CA0C6-A1DC-D60A-0888-A9871AE3C233}"/>
               </a:ext>
             </a:extLst>
           </p:cNvPr>
@@ -4558,173 +4676,20 @@
         </p:blipFill>
         <p:spPr>
           <a:xfrm>
-            <a:off x="628650" y="893877"/>
-            <a:ext cx="4388167" cy="2327733"/>
+            <a:off x="628651" y="1336603"/>
+            <a:ext cx="6686550" cy="4768802"/>
           </a:xfrm>
           <a:prstGeom prst="rect">
             <a:avLst/>
           </a:prstGeom>
         </p:spPr>
       </p:pic>
-      <p:pic>
-        <p:nvPicPr>
-          <p:cNvPr id="7" name="Picture 6">
+      <p:sp>
+        <p:nvSpPr>
+          <p:cNvPr id="6" name="Rectangle: Rounded Corners 5">
             <a:extLst>
               <a:ext uri="{FF2B5EF4-FFF2-40B4-BE49-F238E27FC236}">
-                <a16:creationId xmlns:a16="http://schemas.microsoft.com/office/drawing/2014/main" id="{BEB841CB-B3DD-8B8F-9770-C460509CD2F3}"/>
-              </a:ext>
-            </a:extLst>
-          </p:cNvPr>
-          <p:cNvPicPr>
-            <a:picLocks noChangeAspect="1"/>
-          </p:cNvPicPr>
-          <p:nvPr/>
-        </p:nvPicPr>
-        <p:blipFill>
-          <a:blip r:embed="rId3"/>
-          <a:stretch>
-            <a:fillRect/>
-          </a:stretch>
-        </p:blipFill>
-        <p:spPr>
-          <a:xfrm>
-            <a:off x="5636590" y="957540"/>
-            <a:ext cx="3139765" cy="4528140"/>
-          </a:xfrm>
-          <a:prstGeom prst="rect">
-            <a:avLst/>
-          </a:prstGeom>
-        </p:spPr>
-      </p:pic>
-      <p:sp>
-        <p:nvSpPr>
-          <p:cNvPr id="9" name="TextBox 8">
-            <a:extLst>
-              <a:ext uri="{FF2B5EF4-FFF2-40B4-BE49-F238E27FC236}">
-                <a16:creationId xmlns:a16="http://schemas.microsoft.com/office/drawing/2014/main" id="{68F59E6A-796E-18F4-5410-367F41158BA5}"/>
-              </a:ext>
-            </a:extLst>
-          </p:cNvPr>
-          <p:cNvSpPr txBox="1"/>
-          <p:nvPr/>
-        </p:nvSpPr>
-        <p:spPr>
-          <a:xfrm>
-            <a:off x="418294" y="4855440"/>
-            <a:ext cx="4572000" cy="923330"/>
-          </a:xfrm>
-          <a:prstGeom prst="rect">
-            <a:avLst/>
-          </a:prstGeom>
-          <a:noFill/>
-        </p:spPr>
-        <p:txBody>
-          <a:bodyPr wrap="square">
-            <a:spAutoFit/>
-          </a:bodyPr>
-          <a:lstStyle/>
-          <a:p>
-            <a:r>
-              <a:rPr lang="en-US" dirty="0">
-                <a:hlinkClick r:id="rId4"/>
-              </a:rPr>
-              <a:t>https://github.com/lafefspietz/MEMSduino/raw/main/PCB_files/microd-header-adapter-board-rev2.PcbDoc</a:t>
-            </a:r>
-            <a:r>
-              <a:rPr lang="en-US" dirty="0"/>
-              <a:t> </a:t>
-            </a:r>
-          </a:p>
-        </p:txBody>
-      </p:sp>
-      <p:sp>
-        <p:nvSpPr>
-          <p:cNvPr id="11" name="TextBox 10">
-            <a:extLst>
-              <a:ext uri="{FF2B5EF4-FFF2-40B4-BE49-F238E27FC236}">
-                <a16:creationId xmlns:a16="http://schemas.microsoft.com/office/drawing/2014/main" id="{E04DC9BE-7177-9218-F66E-BD9DCB946376}"/>
-              </a:ext>
-            </a:extLst>
-          </p:cNvPr>
-          <p:cNvSpPr txBox="1"/>
-          <p:nvPr/>
-        </p:nvSpPr>
-        <p:spPr>
-          <a:xfrm>
-            <a:off x="444817" y="3174726"/>
-            <a:ext cx="4572000" cy="923330"/>
-          </a:xfrm>
-          <a:prstGeom prst="rect">
-            <a:avLst/>
-          </a:prstGeom>
-          <a:noFill/>
-        </p:spPr>
-        <p:txBody>
-          <a:bodyPr wrap="square">
-            <a:spAutoFit/>
-          </a:bodyPr>
-          <a:lstStyle/>
-          <a:p>
-            <a:r>
-              <a:rPr lang="en-US" dirty="0">
-                <a:hlinkClick r:id="rId5"/>
-              </a:rPr>
-              <a:t>https://github.com/lafefspietz/MEMSduino/raw/main/PCB_files/microd-header-adapter-board-rev2.SchDoc</a:t>
-            </a:r>
-            <a:r>
-              <a:rPr lang="en-US" dirty="0"/>
-              <a:t> </a:t>
-            </a:r>
-          </a:p>
-        </p:txBody>
-      </p:sp>
-      <p:sp>
-        <p:nvSpPr>
-          <p:cNvPr id="13" name="TextBox 12">
-            <a:extLst>
-              <a:ext uri="{FF2B5EF4-FFF2-40B4-BE49-F238E27FC236}">
-                <a16:creationId xmlns:a16="http://schemas.microsoft.com/office/drawing/2014/main" id="{E5221C87-D1A1-65FD-4D33-86D8A1FF9F99}"/>
-              </a:ext>
-            </a:extLst>
-          </p:cNvPr>
-          <p:cNvSpPr txBox="1"/>
-          <p:nvPr/>
-        </p:nvSpPr>
-        <p:spPr>
-          <a:xfrm>
-            <a:off x="444817" y="4038525"/>
-            <a:ext cx="4572000" cy="923330"/>
-          </a:xfrm>
-          <a:prstGeom prst="rect">
-            <a:avLst/>
-          </a:prstGeom>
-          <a:noFill/>
-        </p:spPr>
-        <p:txBody>
-          <a:bodyPr wrap="square">
-            <a:spAutoFit/>
-          </a:bodyPr>
-          <a:lstStyle/>
-          <a:p>
-            <a:r>
-              <a:rPr lang="en-US" dirty="0">
-                <a:hlinkClick r:id="rId6"/>
-              </a:rPr>
-              <a:t>https://github.com/lafefspietz/MEMSduino/raw/main/PCB_files/microd-header-adapter-board-rev2.PrjPcb</a:t>
-            </a:r>
-            <a:r>
-              <a:rPr lang="en-US" dirty="0"/>
-              <a:t> </a:t>
-            </a:r>
-          </a:p>
-        </p:txBody>
-      </p:sp>
-      <p:sp>
-        <p:nvSpPr>
-          <p:cNvPr id="14" name="Rectangle: Rounded Corners 13">
-            <a:extLst>
-              <a:ext uri="{FF2B5EF4-FFF2-40B4-BE49-F238E27FC236}">
-                <a16:creationId xmlns:a16="http://schemas.microsoft.com/office/drawing/2014/main" id="{37C3E51B-5367-B312-87AE-C3630D8F420E}"/>
+                <a16:creationId xmlns:a16="http://schemas.microsoft.com/office/drawing/2014/main" id="{DA7EB3B4-7F12-3581-3D0D-F8102B649759}"/>
               </a:ext>
             </a:extLst>
           </p:cNvPr>
@@ -4775,7 +4740,7 @@
     </p:spTree>
     <p:extLst>
       <p:ext uri="{BB962C8B-B14F-4D97-AF65-F5344CB8AC3E}">
-        <p14:creationId xmlns:p14="http://schemas.microsoft.com/office/powerpoint/2010/main" val="1011834167"/>
+        <p14:creationId xmlns:p14="http://schemas.microsoft.com/office/powerpoint/2010/main" val="1830095202"/>
       </p:ext>
     </p:extLst>
   </p:cSld>
@@ -4804,10 +4769,227 @@
       </p:grpSpPr>
       <p:sp>
         <p:nvSpPr>
-          <p:cNvPr id="4" name="Rectangle: Rounded Corners 3">
+          <p:cNvPr id="2" name="Title 1">
             <a:extLst>
               <a:ext uri="{FF2B5EF4-FFF2-40B4-BE49-F238E27FC236}">
-                <a16:creationId xmlns:a16="http://schemas.microsoft.com/office/drawing/2014/main" id="{E915C3A0-1839-BADE-47E8-94C846809C6E}"/>
+                <a16:creationId xmlns:a16="http://schemas.microsoft.com/office/drawing/2014/main" id="{BF39A020-48CA-F162-EDFA-B6222569535B}"/>
+              </a:ext>
+            </a:extLst>
+          </p:cNvPr>
+          <p:cNvSpPr>
+            <a:spLocks noGrp="1"/>
+          </p:cNvSpPr>
+          <p:nvPr>
+            <p:ph type="title"/>
+          </p:nvPr>
+        </p:nvSpPr>
+        <p:spPr>
+          <a:xfrm>
+            <a:off x="628650" y="0"/>
+            <a:ext cx="7886700" cy="1325563"/>
+          </a:xfrm>
+        </p:spPr>
+        <p:txBody>
+          <a:bodyPr/>
+          <a:lstStyle/>
+          <a:p>
+            <a:pPr algn="ctr"/>
+            <a:r>
+              <a:rPr lang="en-US" dirty="0"/>
+              <a:t>Altium Designer Files</a:t>
+            </a:r>
+          </a:p>
+        </p:txBody>
+      </p:sp>
+      <p:pic>
+        <p:nvPicPr>
+          <p:cNvPr id="5" name="Picture 4">
+            <a:extLst>
+              <a:ext uri="{FF2B5EF4-FFF2-40B4-BE49-F238E27FC236}">
+                <a16:creationId xmlns:a16="http://schemas.microsoft.com/office/drawing/2014/main" id="{85F7195A-5450-0C90-7483-9634E8C209FA}"/>
+              </a:ext>
+            </a:extLst>
+          </p:cNvPr>
+          <p:cNvPicPr>
+            <a:picLocks noChangeAspect="1"/>
+          </p:cNvPicPr>
+          <p:nvPr/>
+        </p:nvPicPr>
+        <p:blipFill>
+          <a:blip r:embed="rId2"/>
+          <a:stretch>
+            <a:fillRect/>
+          </a:stretch>
+        </p:blipFill>
+        <p:spPr>
+          <a:xfrm>
+            <a:off x="628650" y="893877"/>
+            <a:ext cx="4388167" cy="2327733"/>
+          </a:xfrm>
+          <a:prstGeom prst="rect">
+            <a:avLst/>
+          </a:prstGeom>
+        </p:spPr>
+      </p:pic>
+      <p:pic>
+        <p:nvPicPr>
+          <p:cNvPr id="7" name="Picture 6">
+            <a:extLst>
+              <a:ext uri="{FF2B5EF4-FFF2-40B4-BE49-F238E27FC236}">
+                <a16:creationId xmlns:a16="http://schemas.microsoft.com/office/drawing/2014/main" id="{BEB841CB-B3DD-8B8F-9770-C460509CD2F3}"/>
+              </a:ext>
+            </a:extLst>
+          </p:cNvPr>
+          <p:cNvPicPr>
+            <a:picLocks noChangeAspect="1"/>
+          </p:cNvPicPr>
+          <p:nvPr/>
+        </p:nvPicPr>
+        <p:blipFill>
+          <a:blip r:embed="rId3"/>
+          <a:stretch>
+            <a:fillRect/>
+          </a:stretch>
+        </p:blipFill>
+        <p:spPr>
+          <a:xfrm>
+            <a:off x="5636590" y="957540"/>
+            <a:ext cx="3139765" cy="4528140"/>
+          </a:xfrm>
+          <a:prstGeom prst="rect">
+            <a:avLst/>
+          </a:prstGeom>
+        </p:spPr>
+      </p:pic>
+      <p:sp>
+        <p:nvSpPr>
+          <p:cNvPr id="9" name="TextBox 8">
+            <a:extLst>
+              <a:ext uri="{FF2B5EF4-FFF2-40B4-BE49-F238E27FC236}">
+                <a16:creationId xmlns:a16="http://schemas.microsoft.com/office/drawing/2014/main" id="{68F59E6A-796E-18F4-5410-367F41158BA5}"/>
+              </a:ext>
+            </a:extLst>
+          </p:cNvPr>
+          <p:cNvSpPr txBox="1"/>
+          <p:nvPr/>
+        </p:nvSpPr>
+        <p:spPr>
+          <a:xfrm>
+            <a:off x="418294" y="4855440"/>
+            <a:ext cx="4572000" cy="923330"/>
+          </a:xfrm>
+          <a:prstGeom prst="rect">
+            <a:avLst/>
+          </a:prstGeom>
+          <a:noFill/>
+        </p:spPr>
+        <p:txBody>
+          <a:bodyPr wrap="square">
+            <a:spAutoFit/>
+          </a:bodyPr>
+          <a:lstStyle/>
+          <a:p>
+            <a:r>
+              <a:rPr lang="en-US" dirty="0">
+                <a:hlinkClick r:id="rId4"/>
+              </a:rPr>
+              <a:t>https://github.com/lafefspietz/MEMSduino/raw/main/PCB_files/microd-header-adapter-board-rev2.PcbDoc</a:t>
+            </a:r>
+            <a:r>
+              <a:rPr lang="en-US" dirty="0"/>
+              <a:t> </a:t>
+            </a:r>
+          </a:p>
+        </p:txBody>
+      </p:sp>
+      <p:sp>
+        <p:nvSpPr>
+          <p:cNvPr id="11" name="TextBox 10">
+            <a:extLst>
+              <a:ext uri="{FF2B5EF4-FFF2-40B4-BE49-F238E27FC236}">
+                <a16:creationId xmlns:a16="http://schemas.microsoft.com/office/drawing/2014/main" id="{E04DC9BE-7177-9218-F66E-BD9DCB946376}"/>
+              </a:ext>
+            </a:extLst>
+          </p:cNvPr>
+          <p:cNvSpPr txBox="1"/>
+          <p:nvPr/>
+        </p:nvSpPr>
+        <p:spPr>
+          <a:xfrm>
+            <a:off x="444817" y="3174726"/>
+            <a:ext cx="4572000" cy="923330"/>
+          </a:xfrm>
+          <a:prstGeom prst="rect">
+            <a:avLst/>
+          </a:prstGeom>
+          <a:noFill/>
+        </p:spPr>
+        <p:txBody>
+          <a:bodyPr wrap="square">
+            <a:spAutoFit/>
+          </a:bodyPr>
+          <a:lstStyle/>
+          <a:p>
+            <a:r>
+              <a:rPr lang="en-US" dirty="0">
+                <a:hlinkClick r:id="rId5"/>
+              </a:rPr>
+              <a:t>https://github.com/lafefspietz/MEMSduino/raw/main/PCB_files/microd-header-adapter-board-rev2.SchDoc</a:t>
+            </a:r>
+            <a:r>
+              <a:rPr lang="en-US" dirty="0"/>
+              <a:t> </a:t>
+            </a:r>
+          </a:p>
+        </p:txBody>
+      </p:sp>
+      <p:sp>
+        <p:nvSpPr>
+          <p:cNvPr id="13" name="TextBox 12">
+            <a:extLst>
+              <a:ext uri="{FF2B5EF4-FFF2-40B4-BE49-F238E27FC236}">
+                <a16:creationId xmlns:a16="http://schemas.microsoft.com/office/drawing/2014/main" id="{E5221C87-D1A1-65FD-4D33-86D8A1FF9F99}"/>
+              </a:ext>
+            </a:extLst>
+          </p:cNvPr>
+          <p:cNvSpPr txBox="1"/>
+          <p:nvPr/>
+        </p:nvSpPr>
+        <p:spPr>
+          <a:xfrm>
+            <a:off x="444817" y="4038525"/>
+            <a:ext cx="4572000" cy="923330"/>
+          </a:xfrm>
+          <a:prstGeom prst="rect">
+            <a:avLst/>
+          </a:prstGeom>
+          <a:noFill/>
+        </p:spPr>
+        <p:txBody>
+          <a:bodyPr wrap="square">
+            <a:spAutoFit/>
+          </a:bodyPr>
+          <a:lstStyle/>
+          <a:p>
+            <a:r>
+              <a:rPr lang="en-US" dirty="0">
+                <a:hlinkClick r:id="rId6"/>
+              </a:rPr>
+              <a:t>https://github.com/lafefspietz/MEMSduino/raw/main/PCB_files/microd-header-adapter-board-rev2.PrjPcb</a:t>
+            </a:r>
+            <a:r>
+              <a:rPr lang="en-US" dirty="0"/>
+              <a:t> </a:t>
+            </a:r>
+          </a:p>
+        </p:txBody>
+      </p:sp>
+      <p:sp>
+        <p:nvSpPr>
+          <p:cNvPr id="14" name="Rectangle: Rounded Corners 13">
+            <a:extLst>
+              <a:ext uri="{FF2B5EF4-FFF2-40B4-BE49-F238E27FC236}">
+                <a16:creationId xmlns:a16="http://schemas.microsoft.com/office/drawing/2014/main" id="{37C3E51B-5367-B312-87AE-C3630D8F420E}"/>
               </a:ext>
             </a:extLst>
           </p:cNvPr>
@@ -4816,7 +4998,7 @@
         </p:nvSpPr>
         <p:spPr>
           <a:xfrm>
-            <a:off x="3117900" y="6086117"/>
+            <a:off x="3078130" y="6103628"/>
             <a:ext cx="2671807" cy="613345"/>
           </a:xfrm>
           <a:prstGeom prst="roundRect">
@@ -4855,72 +5037,10 @@
           </a:p>
         </p:txBody>
       </p:sp>
-      <p:sp>
-        <p:nvSpPr>
-          <p:cNvPr id="6" name="Rectangle: Rounded Corners 5">
-            <a:extLst>
-              <a:ext uri="{FF2B5EF4-FFF2-40B4-BE49-F238E27FC236}">
-                <a16:creationId xmlns:a16="http://schemas.microsoft.com/office/drawing/2014/main" id="{CA2625D8-00CB-1F5D-EC16-0451272B4EFC}"/>
-              </a:ext>
-            </a:extLst>
-          </p:cNvPr>
-          <p:cNvSpPr/>
-          <p:nvPr/>
-        </p:nvSpPr>
-        <p:spPr>
-          <a:xfrm>
-            <a:off x="446586" y="273377"/>
-            <a:ext cx="8621999" cy="5812739"/>
-          </a:xfrm>
-          <a:prstGeom prst="roundRect">
-            <a:avLst/>
-          </a:prstGeom>
-          <a:solidFill>
-            <a:srgbClr val="00B0F0"/>
-          </a:solidFill>
-          <a:ln>
-            <a:solidFill>
-              <a:schemeClr val="tx1"/>
-            </a:solidFill>
-          </a:ln>
-        </p:spPr>
-        <p:style>
-          <a:lnRef idx="3">
-            <a:schemeClr val="lt1"/>
-          </a:lnRef>
-          <a:fillRef idx="1">
-            <a:schemeClr val="accent6"/>
-          </a:fillRef>
-          <a:effectRef idx="1">
-            <a:schemeClr val="accent6"/>
-          </a:effectRef>
-          <a:fontRef idx="minor">
-            <a:schemeClr val="lt1"/>
-          </a:fontRef>
-        </p:style>
-        <p:txBody>
-          <a:bodyPr rtlCol="0" anchor="ctr"/>
-          <a:lstStyle/>
-          <a:p>
-            <a:pPr algn="ctr"/>
-            <a:r>
-              <a:rPr lang="en-US" sz="3600" dirty="0"/>
-              <a:t>Conclusions:</a:t>
-            </a:r>
-          </a:p>
-          <a:p>
-            <a:pPr algn="ctr"/>
-            <a:r>
-              <a:rPr lang="en-US" sz="3600" dirty="0"/>
-              <a:t>Note that pins 13 and 12 connect to ground.  This might not be ideal in certain circumstances. We have broken ground at room temperature and use the metal in the dilution refrigerator for the ground now. This board will almost certainly be different from what other users will want. This example drives all 4 control lines of 4 MEMS switches.</a:t>
-            </a:r>
-          </a:p>
-        </p:txBody>
-      </p:sp>
     </p:spTree>
     <p:extLst>
       <p:ext uri="{BB962C8B-B14F-4D97-AF65-F5344CB8AC3E}">
-        <p14:creationId xmlns:p14="http://schemas.microsoft.com/office/powerpoint/2010/main" val="2471455650"/>
+        <p14:creationId xmlns:p14="http://schemas.microsoft.com/office/powerpoint/2010/main" val="1011834167"/>
       </p:ext>
     </p:extLst>
   </p:cSld>

</xml_diff>